<commit_message>
Introduction read and typos fixed
</commit_message>
<xml_diff>
--- a/declarationTable.pptx
+++ b/declarationTable.pptx
@@ -2,12 +2,12 @@
 <file path=ppt/presentation.xml><?xml version="1.0" encoding="utf-8"?>
 <p:presentation xmlns:a="http://schemas.openxmlformats.org/drawingml/2006/main" xmlns:r="http://schemas.openxmlformats.org/officeDocument/2006/relationships" xmlns:p="http://schemas.openxmlformats.org/presentationml/2006/main" saveSubsetFonts="1" autoCompressPictures="0">
   <p:sldMasterIdLst>
-    <p:sldMasterId id="2147483732" r:id="rId1"/>
+    <p:sldMasterId id="2147483744" r:id="rId1"/>
   </p:sldMasterIdLst>
   <p:sldIdLst>
     <p:sldId id="256" r:id="rId2"/>
   </p:sldIdLst>
-  <p:sldSz cx="7559675" cy="5400675"/>
+  <p:sldSz cx="7559675" cy="4679950"/>
   <p:notesSz cx="6858000" cy="9144000"/>
   <p:defaultTextStyle>
     <a:defPPr>
@@ -136,15 +136,15 @@
         </p:nvSpPr>
         <p:spPr>
           <a:xfrm>
-            <a:off x="566976" y="883861"/>
-            <a:ext cx="6425724" cy="1880235"/>
+            <a:off x="944960" y="765909"/>
+            <a:ext cx="5669756" cy="1629316"/>
           </a:xfrm>
         </p:spPr>
         <p:txBody>
           <a:bodyPr anchor="b"/>
           <a:lstStyle>
             <a:lvl1pPr algn="ctr">
-              <a:defRPr sz="4725"/>
+              <a:defRPr sz="3721"/>
             </a:lvl1pPr>
           </a:lstStyle>
           <a:p>
@@ -168,8 +168,8 @@
         </p:nvSpPr>
         <p:spPr>
           <a:xfrm>
-            <a:off x="944960" y="2836605"/>
-            <a:ext cx="5669756" cy="1303913"/>
+            <a:off x="944960" y="2458058"/>
+            <a:ext cx="5669756" cy="1129904"/>
           </a:xfrm>
         </p:spPr>
         <p:txBody>
@@ -177,39 +177,39 @@
           <a:lstStyle>
             <a:lvl1pPr marL="0" indent="0" algn="ctr">
               <a:buNone/>
-              <a:defRPr sz="1890"/>
+              <a:defRPr sz="1488"/>
             </a:lvl1pPr>
-            <a:lvl2pPr marL="360045" indent="0" algn="ctr">
-              <a:buNone/>
-              <a:defRPr sz="1575"/>
+            <a:lvl2pPr marL="283510" indent="0" algn="ctr">
+              <a:buNone/>
+              <a:defRPr sz="1240"/>
             </a:lvl2pPr>
-            <a:lvl3pPr marL="720090" indent="0" algn="ctr">
-              <a:buNone/>
-              <a:defRPr sz="1418"/>
+            <a:lvl3pPr marL="567019" indent="0" algn="ctr">
+              <a:buNone/>
+              <a:defRPr sz="1116"/>
             </a:lvl3pPr>
-            <a:lvl4pPr marL="1080135" indent="0" algn="ctr">
-              <a:buNone/>
-              <a:defRPr sz="1260"/>
+            <a:lvl4pPr marL="850529" indent="0" algn="ctr">
+              <a:buNone/>
+              <a:defRPr sz="992"/>
             </a:lvl4pPr>
-            <a:lvl5pPr marL="1440180" indent="0" algn="ctr">
-              <a:buNone/>
-              <a:defRPr sz="1260"/>
+            <a:lvl5pPr marL="1134039" indent="0" algn="ctr">
+              <a:buNone/>
+              <a:defRPr sz="992"/>
             </a:lvl5pPr>
-            <a:lvl6pPr marL="1800225" indent="0" algn="ctr">
-              <a:buNone/>
-              <a:defRPr sz="1260"/>
+            <a:lvl6pPr marL="1417549" indent="0" algn="ctr">
+              <a:buNone/>
+              <a:defRPr sz="992"/>
             </a:lvl6pPr>
-            <a:lvl7pPr marL="2160270" indent="0" algn="ctr">
-              <a:buNone/>
-              <a:defRPr sz="1260"/>
+            <a:lvl7pPr marL="1701058" indent="0" algn="ctr">
+              <a:buNone/>
+              <a:defRPr sz="992"/>
             </a:lvl7pPr>
-            <a:lvl8pPr marL="2520315" indent="0" algn="ctr">
-              <a:buNone/>
-              <a:defRPr sz="1260"/>
+            <a:lvl8pPr marL="1984568" indent="0" algn="ctr">
+              <a:buNone/>
+              <a:defRPr sz="992"/>
             </a:lvl8pPr>
-            <a:lvl9pPr marL="2880360" indent="0" algn="ctr">
-              <a:buNone/>
-              <a:defRPr sz="1260"/>
+            <a:lvl9pPr marL="2268078" indent="0" algn="ctr">
+              <a:buNone/>
+              <a:defRPr sz="992"/>
             </a:lvl9pPr>
           </a:lstStyle>
           <a:p>
@@ -289,7 +289,7 @@
     </p:spTree>
     <p:extLst>
       <p:ext uri="{BB962C8B-B14F-4D97-AF65-F5344CB8AC3E}">
-        <p14:creationId xmlns:p14="http://schemas.microsoft.com/office/powerpoint/2010/main" val="2405843955"/>
+        <p14:creationId xmlns:p14="http://schemas.microsoft.com/office/powerpoint/2010/main" val="2610299246"/>
       </p:ext>
     </p:extLst>
   </p:cSld>
@@ -459,7 +459,7 @@
     </p:spTree>
     <p:extLst>
       <p:ext uri="{BB962C8B-B14F-4D97-AF65-F5344CB8AC3E}">
-        <p14:creationId xmlns:p14="http://schemas.microsoft.com/office/powerpoint/2010/main" val="3403372497"/>
+        <p14:creationId xmlns:p14="http://schemas.microsoft.com/office/powerpoint/2010/main" val="3156908117"/>
       </p:ext>
     </p:extLst>
   </p:cSld>
@@ -498,8 +498,8 @@
         </p:nvSpPr>
         <p:spPr>
           <a:xfrm>
-            <a:off x="5409893" y="287536"/>
-            <a:ext cx="1630055" cy="4576822"/>
+            <a:off x="5409892" y="249164"/>
+            <a:ext cx="1630055" cy="3966041"/>
           </a:xfrm>
         </p:spPr>
         <p:txBody>
@@ -526,8 +526,8 @@
         </p:nvSpPr>
         <p:spPr>
           <a:xfrm>
-            <a:off x="519728" y="287536"/>
-            <a:ext cx="4795669" cy="4576822"/>
+            <a:off x="519728" y="249164"/>
+            <a:ext cx="4795669" cy="3966041"/>
           </a:xfrm>
         </p:spPr>
         <p:txBody>
@@ -639,7 +639,7 @@
     </p:spTree>
     <p:extLst>
       <p:ext uri="{BB962C8B-B14F-4D97-AF65-F5344CB8AC3E}">
-        <p14:creationId xmlns:p14="http://schemas.microsoft.com/office/powerpoint/2010/main" val="3182790206"/>
+        <p14:creationId xmlns:p14="http://schemas.microsoft.com/office/powerpoint/2010/main" val="3186079422"/>
       </p:ext>
     </p:extLst>
   </p:cSld>
@@ -809,7 +809,7 @@
     </p:spTree>
     <p:extLst>
       <p:ext uri="{BB962C8B-B14F-4D97-AF65-F5344CB8AC3E}">
-        <p14:creationId xmlns:p14="http://schemas.microsoft.com/office/powerpoint/2010/main" val="1397981927"/>
+        <p14:creationId xmlns:p14="http://schemas.microsoft.com/office/powerpoint/2010/main" val="1057141695"/>
       </p:ext>
     </p:extLst>
   </p:cSld>
@@ -848,15 +848,15 @@
         </p:nvSpPr>
         <p:spPr>
           <a:xfrm>
-            <a:off x="515791" y="1346420"/>
-            <a:ext cx="6520220" cy="2246530"/>
+            <a:off x="515790" y="1166738"/>
+            <a:ext cx="6520220" cy="1946729"/>
           </a:xfrm>
         </p:spPr>
         <p:txBody>
           <a:bodyPr anchor="b"/>
           <a:lstStyle>
             <a:lvl1pPr>
-              <a:defRPr sz="4725"/>
+              <a:defRPr sz="3721"/>
             </a:lvl1pPr>
           </a:lstStyle>
           <a:p>
@@ -880,8 +880,8 @@
         </p:nvSpPr>
         <p:spPr>
           <a:xfrm>
-            <a:off x="515791" y="3614203"/>
-            <a:ext cx="6520220" cy="1181397"/>
+            <a:off x="515790" y="3131884"/>
+            <a:ext cx="6520220" cy="1023739"/>
           </a:xfrm>
         </p:spPr>
         <p:txBody>
@@ -889,15 +889,17 @@
           <a:lstStyle>
             <a:lvl1pPr marL="0" indent="0">
               <a:buNone/>
-              <a:defRPr sz="1890">
+              <a:defRPr sz="1488">
                 <a:solidFill>
-                  <a:schemeClr val="tx1"/>
+                  <a:schemeClr val="tx1">
+                    <a:tint val="75000"/>
+                  </a:schemeClr>
                 </a:solidFill>
               </a:defRPr>
             </a:lvl1pPr>
-            <a:lvl2pPr marL="360045" indent="0">
-              <a:buNone/>
-              <a:defRPr sz="1575">
+            <a:lvl2pPr marL="283510" indent="0">
+              <a:buNone/>
+              <a:defRPr sz="1240">
                 <a:solidFill>
                   <a:schemeClr val="tx1">
                     <a:tint val="75000"/>
@@ -905,9 +907,9 @@
                 </a:solidFill>
               </a:defRPr>
             </a:lvl2pPr>
-            <a:lvl3pPr marL="720090" indent="0">
-              <a:buNone/>
-              <a:defRPr sz="1418">
+            <a:lvl3pPr marL="567019" indent="0">
+              <a:buNone/>
+              <a:defRPr sz="1116">
                 <a:solidFill>
                   <a:schemeClr val="tx1">
                     <a:tint val="75000"/>
@@ -915,9 +917,9 @@
                 </a:solidFill>
               </a:defRPr>
             </a:lvl3pPr>
-            <a:lvl4pPr marL="1080135" indent="0">
-              <a:buNone/>
-              <a:defRPr sz="1260">
+            <a:lvl4pPr marL="850529" indent="0">
+              <a:buNone/>
+              <a:defRPr sz="992">
                 <a:solidFill>
                   <a:schemeClr val="tx1">
                     <a:tint val="75000"/>
@@ -925,9 +927,9 @@
                 </a:solidFill>
               </a:defRPr>
             </a:lvl4pPr>
-            <a:lvl5pPr marL="1440180" indent="0">
-              <a:buNone/>
-              <a:defRPr sz="1260">
+            <a:lvl5pPr marL="1134039" indent="0">
+              <a:buNone/>
+              <a:defRPr sz="992">
                 <a:solidFill>
                   <a:schemeClr val="tx1">
                     <a:tint val="75000"/>
@@ -935,9 +937,9 @@
                 </a:solidFill>
               </a:defRPr>
             </a:lvl5pPr>
-            <a:lvl6pPr marL="1800225" indent="0">
-              <a:buNone/>
-              <a:defRPr sz="1260">
+            <a:lvl6pPr marL="1417549" indent="0">
+              <a:buNone/>
+              <a:defRPr sz="992">
                 <a:solidFill>
                   <a:schemeClr val="tx1">
                     <a:tint val="75000"/>
@@ -945,9 +947,9 @@
                 </a:solidFill>
               </a:defRPr>
             </a:lvl6pPr>
-            <a:lvl7pPr marL="2160270" indent="0">
-              <a:buNone/>
-              <a:defRPr sz="1260">
+            <a:lvl7pPr marL="1701058" indent="0">
+              <a:buNone/>
+              <a:defRPr sz="992">
                 <a:solidFill>
                   <a:schemeClr val="tx1">
                     <a:tint val="75000"/>
@@ -955,9 +957,9 @@
                 </a:solidFill>
               </a:defRPr>
             </a:lvl7pPr>
-            <a:lvl8pPr marL="2520315" indent="0">
-              <a:buNone/>
-              <a:defRPr sz="1260">
+            <a:lvl8pPr marL="1984568" indent="0">
+              <a:buNone/>
+              <a:defRPr sz="992">
                 <a:solidFill>
                   <a:schemeClr val="tx1">
                     <a:tint val="75000"/>
@@ -965,9 +967,9 @@
                 </a:solidFill>
               </a:defRPr>
             </a:lvl8pPr>
-            <a:lvl9pPr marL="2880360" indent="0">
-              <a:buNone/>
-              <a:defRPr sz="1260">
+            <a:lvl9pPr marL="2268078" indent="0">
+              <a:buNone/>
+              <a:defRPr sz="992">
                 <a:solidFill>
                   <a:schemeClr val="tx1">
                     <a:tint val="75000"/>
@@ -1053,7 +1055,7 @@
     </p:spTree>
     <p:extLst>
       <p:ext uri="{BB962C8B-B14F-4D97-AF65-F5344CB8AC3E}">
-        <p14:creationId xmlns:p14="http://schemas.microsoft.com/office/powerpoint/2010/main" val="2169148693"/>
+        <p14:creationId xmlns:p14="http://schemas.microsoft.com/office/powerpoint/2010/main" val="3238900173"/>
       </p:ext>
     </p:extLst>
   </p:cSld>
@@ -1115,8 +1117,8 @@
         </p:nvSpPr>
         <p:spPr>
           <a:xfrm>
-            <a:off x="519728" y="1437680"/>
-            <a:ext cx="3212862" cy="3426679"/>
+            <a:off x="519728" y="1245820"/>
+            <a:ext cx="3212862" cy="2969385"/>
           </a:xfrm>
         </p:spPr>
         <p:txBody>
@@ -1172,8 +1174,8 @@
         </p:nvSpPr>
         <p:spPr>
           <a:xfrm>
-            <a:off x="3827085" y="1437680"/>
-            <a:ext cx="3212862" cy="3426679"/>
+            <a:off x="3827085" y="1245820"/>
+            <a:ext cx="3212862" cy="2969385"/>
           </a:xfrm>
         </p:spPr>
         <p:txBody>
@@ -1285,7 +1287,7 @@
     </p:spTree>
     <p:extLst>
       <p:ext uri="{BB962C8B-B14F-4D97-AF65-F5344CB8AC3E}">
-        <p14:creationId xmlns:p14="http://schemas.microsoft.com/office/powerpoint/2010/main" val="1652611076"/>
+        <p14:creationId xmlns:p14="http://schemas.microsoft.com/office/powerpoint/2010/main" val="688536103"/>
       </p:ext>
     </p:extLst>
   </p:cSld>
@@ -1324,8 +1326,8 @@
         </p:nvSpPr>
         <p:spPr>
           <a:xfrm>
-            <a:off x="520712" y="287537"/>
-            <a:ext cx="6520220" cy="1043881"/>
+            <a:off x="520712" y="249164"/>
+            <a:ext cx="6520220" cy="904574"/>
           </a:xfrm>
         </p:spPr>
         <p:txBody>
@@ -1352,8 +1354,8 @@
         </p:nvSpPr>
         <p:spPr>
           <a:xfrm>
-            <a:off x="520713" y="1323916"/>
-            <a:ext cx="3198096" cy="648831"/>
+            <a:off x="520712" y="1147238"/>
+            <a:ext cx="3198097" cy="562244"/>
           </a:xfrm>
         </p:spPr>
         <p:txBody>
@@ -1361,39 +1363,39 @@
           <a:lstStyle>
             <a:lvl1pPr marL="0" indent="0">
               <a:buNone/>
-              <a:defRPr sz="1890" b="1"/>
+              <a:defRPr sz="1488" b="1"/>
             </a:lvl1pPr>
-            <a:lvl2pPr marL="360045" indent="0">
-              <a:buNone/>
-              <a:defRPr sz="1575" b="1"/>
+            <a:lvl2pPr marL="283510" indent="0">
+              <a:buNone/>
+              <a:defRPr sz="1240" b="1"/>
             </a:lvl2pPr>
-            <a:lvl3pPr marL="720090" indent="0">
-              <a:buNone/>
-              <a:defRPr sz="1418" b="1"/>
+            <a:lvl3pPr marL="567019" indent="0">
+              <a:buNone/>
+              <a:defRPr sz="1116" b="1"/>
             </a:lvl3pPr>
-            <a:lvl4pPr marL="1080135" indent="0">
-              <a:buNone/>
-              <a:defRPr sz="1260" b="1"/>
+            <a:lvl4pPr marL="850529" indent="0">
+              <a:buNone/>
+              <a:defRPr sz="992" b="1"/>
             </a:lvl4pPr>
-            <a:lvl5pPr marL="1440180" indent="0">
-              <a:buNone/>
-              <a:defRPr sz="1260" b="1"/>
+            <a:lvl5pPr marL="1134039" indent="0">
+              <a:buNone/>
+              <a:defRPr sz="992" b="1"/>
             </a:lvl5pPr>
-            <a:lvl6pPr marL="1800225" indent="0">
-              <a:buNone/>
-              <a:defRPr sz="1260" b="1"/>
+            <a:lvl6pPr marL="1417549" indent="0">
+              <a:buNone/>
+              <a:defRPr sz="992" b="1"/>
             </a:lvl6pPr>
-            <a:lvl7pPr marL="2160270" indent="0">
-              <a:buNone/>
-              <a:defRPr sz="1260" b="1"/>
+            <a:lvl7pPr marL="1701058" indent="0">
+              <a:buNone/>
+              <a:defRPr sz="992" b="1"/>
             </a:lvl7pPr>
-            <a:lvl8pPr marL="2520315" indent="0">
-              <a:buNone/>
-              <a:defRPr sz="1260" b="1"/>
+            <a:lvl8pPr marL="1984568" indent="0">
+              <a:buNone/>
+              <a:defRPr sz="992" b="1"/>
             </a:lvl8pPr>
-            <a:lvl9pPr marL="2880360" indent="0">
-              <a:buNone/>
-              <a:defRPr sz="1260" b="1"/>
+            <a:lvl9pPr marL="2268078" indent="0">
+              <a:buNone/>
+              <a:defRPr sz="992" b="1"/>
             </a:lvl9pPr>
           </a:lstStyle>
           <a:p>
@@ -1417,8 +1419,8 @@
         </p:nvSpPr>
         <p:spPr>
           <a:xfrm>
-            <a:off x="520713" y="1972747"/>
-            <a:ext cx="3198096" cy="2901613"/>
+            <a:off x="520712" y="1709482"/>
+            <a:ext cx="3198097" cy="2514390"/>
           </a:xfrm>
         </p:spPr>
         <p:txBody>
@@ -1474,8 +1476,8 @@
         </p:nvSpPr>
         <p:spPr>
           <a:xfrm>
-            <a:off x="3827086" y="1323916"/>
-            <a:ext cx="3213847" cy="648831"/>
+            <a:off x="3827085" y="1147238"/>
+            <a:ext cx="3213847" cy="562244"/>
           </a:xfrm>
         </p:spPr>
         <p:txBody>
@@ -1483,39 +1485,39 @@
           <a:lstStyle>
             <a:lvl1pPr marL="0" indent="0">
               <a:buNone/>
-              <a:defRPr sz="1890" b="1"/>
+              <a:defRPr sz="1488" b="1"/>
             </a:lvl1pPr>
-            <a:lvl2pPr marL="360045" indent="0">
-              <a:buNone/>
-              <a:defRPr sz="1575" b="1"/>
+            <a:lvl2pPr marL="283510" indent="0">
+              <a:buNone/>
+              <a:defRPr sz="1240" b="1"/>
             </a:lvl2pPr>
-            <a:lvl3pPr marL="720090" indent="0">
-              <a:buNone/>
-              <a:defRPr sz="1418" b="1"/>
+            <a:lvl3pPr marL="567019" indent="0">
+              <a:buNone/>
+              <a:defRPr sz="1116" b="1"/>
             </a:lvl3pPr>
-            <a:lvl4pPr marL="1080135" indent="0">
-              <a:buNone/>
-              <a:defRPr sz="1260" b="1"/>
+            <a:lvl4pPr marL="850529" indent="0">
+              <a:buNone/>
+              <a:defRPr sz="992" b="1"/>
             </a:lvl4pPr>
-            <a:lvl5pPr marL="1440180" indent="0">
-              <a:buNone/>
-              <a:defRPr sz="1260" b="1"/>
+            <a:lvl5pPr marL="1134039" indent="0">
+              <a:buNone/>
+              <a:defRPr sz="992" b="1"/>
             </a:lvl5pPr>
-            <a:lvl6pPr marL="1800225" indent="0">
-              <a:buNone/>
-              <a:defRPr sz="1260" b="1"/>
+            <a:lvl6pPr marL="1417549" indent="0">
+              <a:buNone/>
+              <a:defRPr sz="992" b="1"/>
             </a:lvl6pPr>
-            <a:lvl7pPr marL="2160270" indent="0">
-              <a:buNone/>
-              <a:defRPr sz="1260" b="1"/>
+            <a:lvl7pPr marL="1701058" indent="0">
+              <a:buNone/>
+              <a:defRPr sz="992" b="1"/>
             </a:lvl7pPr>
-            <a:lvl8pPr marL="2520315" indent="0">
-              <a:buNone/>
-              <a:defRPr sz="1260" b="1"/>
+            <a:lvl8pPr marL="1984568" indent="0">
+              <a:buNone/>
+              <a:defRPr sz="992" b="1"/>
             </a:lvl8pPr>
-            <a:lvl9pPr marL="2880360" indent="0">
-              <a:buNone/>
-              <a:defRPr sz="1260" b="1"/>
+            <a:lvl9pPr marL="2268078" indent="0">
+              <a:buNone/>
+              <a:defRPr sz="992" b="1"/>
             </a:lvl9pPr>
           </a:lstStyle>
           <a:p>
@@ -1539,8 +1541,8 @@
         </p:nvSpPr>
         <p:spPr>
           <a:xfrm>
-            <a:off x="3827086" y="1972747"/>
-            <a:ext cx="3213847" cy="2901613"/>
+            <a:off x="3827085" y="1709482"/>
+            <a:ext cx="3213847" cy="2514390"/>
           </a:xfrm>
         </p:spPr>
         <p:txBody>
@@ -1652,7 +1654,7 @@
     </p:spTree>
     <p:extLst>
       <p:ext uri="{BB962C8B-B14F-4D97-AF65-F5344CB8AC3E}">
-        <p14:creationId xmlns:p14="http://schemas.microsoft.com/office/powerpoint/2010/main" val="3872320980"/>
+        <p14:creationId xmlns:p14="http://schemas.microsoft.com/office/powerpoint/2010/main" val="3754862942"/>
       </p:ext>
     </p:extLst>
   </p:cSld>
@@ -1770,7 +1772,7 @@
     </p:spTree>
     <p:extLst>
       <p:ext uri="{BB962C8B-B14F-4D97-AF65-F5344CB8AC3E}">
-        <p14:creationId xmlns:p14="http://schemas.microsoft.com/office/powerpoint/2010/main" val="4290966288"/>
+        <p14:creationId xmlns:p14="http://schemas.microsoft.com/office/powerpoint/2010/main" val="766805610"/>
       </p:ext>
     </p:extLst>
   </p:cSld>
@@ -1865,7 +1867,7 @@
     </p:spTree>
     <p:extLst>
       <p:ext uri="{BB962C8B-B14F-4D97-AF65-F5344CB8AC3E}">
-        <p14:creationId xmlns:p14="http://schemas.microsoft.com/office/powerpoint/2010/main" val="1322760594"/>
+        <p14:creationId xmlns:p14="http://schemas.microsoft.com/office/powerpoint/2010/main" val="3668102726"/>
       </p:ext>
     </p:extLst>
   </p:cSld>
@@ -1904,15 +1906,15 @@
         </p:nvSpPr>
         <p:spPr>
           <a:xfrm>
-            <a:off x="520712" y="360045"/>
-            <a:ext cx="2438192" cy="1260158"/>
+            <a:off x="520712" y="311997"/>
+            <a:ext cx="2438192" cy="1091988"/>
           </a:xfrm>
         </p:spPr>
         <p:txBody>
           <a:bodyPr anchor="b"/>
           <a:lstStyle>
             <a:lvl1pPr>
-              <a:defRPr sz="2520"/>
+              <a:defRPr sz="1984"/>
             </a:lvl1pPr>
           </a:lstStyle>
           <a:p>
@@ -1936,39 +1938,39 @@
         </p:nvSpPr>
         <p:spPr>
           <a:xfrm>
-            <a:off x="3213847" y="777598"/>
-            <a:ext cx="3827085" cy="3837980"/>
+            <a:off x="3213847" y="673826"/>
+            <a:ext cx="3827085" cy="3325798"/>
           </a:xfrm>
         </p:spPr>
         <p:txBody>
           <a:bodyPr/>
           <a:lstStyle>
             <a:lvl1pPr>
-              <a:defRPr sz="2520"/>
+              <a:defRPr sz="1984"/>
             </a:lvl1pPr>
             <a:lvl2pPr>
-              <a:defRPr sz="2205"/>
+              <a:defRPr sz="1736"/>
             </a:lvl2pPr>
             <a:lvl3pPr>
-              <a:defRPr sz="1890"/>
+              <a:defRPr sz="1488"/>
             </a:lvl3pPr>
             <a:lvl4pPr>
-              <a:defRPr sz="1575"/>
+              <a:defRPr sz="1240"/>
             </a:lvl4pPr>
             <a:lvl5pPr>
-              <a:defRPr sz="1575"/>
+              <a:defRPr sz="1240"/>
             </a:lvl5pPr>
             <a:lvl6pPr>
-              <a:defRPr sz="1575"/>
+              <a:defRPr sz="1240"/>
             </a:lvl6pPr>
             <a:lvl7pPr>
-              <a:defRPr sz="1575"/>
+              <a:defRPr sz="1240"/>
             </a:lvl7pPr>
             <a:lvl8pPr>
-              <a:defRPr sz="1575"/>
+              <a:defRPr sz="1240"/>
             </a:lvl8pPr>
             <a:lvl9pPr>
-              <a:defRPr sz="1575"/>
+              <a:defRPr sz="1240"/>
             </a:lvl9pPr>
           </a:lstStyle>
           <a:p>
@@ -2021,8 +2023,8 @@
         </p:nvSpPr>
         <p:spPr>
           <a:xfrm>
-            <a:off x="520712" y="1620202"/>
-            <a:ext cx="2438192" cy="3001626"/>
+            <a:off x="520712" y="1403985"/>
+            <a:ext cx="2438192" cy="2601056"/>
           </a:xfrm>
         </p:spPr>
         <p:txBody>
@@ -2030,39 +2032,39 @@
           <a:lstStyle>
             <a:lvl1pPr marL="0" indent="0">
               <a:buNone/>
-              <a:defRPr sz="1260"/>
+              <a:defRPr sz="992"/>
             </a:lvl1pPr>
-            <a:lvl2pPr marL="360045" indent="0">
-              <a:buNone/>
-              <a:defRPr sz="1103"/>
+            <a:lvl2pPr marL="283510" indent="0">
+              <a:buNone/>
+              <a:defRPr sz="868"/>
             </a:lvl2pPr>
-            <a:lvl3pPr marL="720090" indent="0">
-              <a:buNone/>
-              <a:defRPr sz="945"/>
+            <a:lvl3pPr marL="567019" indent="0">
+              <a:buNone/>
+              <a:defRPr sz="744"/>
             </a:lvl3pPr>
-            <a:lvl4pPr marL="1080135" indent="0">
-              <a:buNone/>
-              <a:defRPr sz="788"/>
+            <a:lvl4pPr marL="850529" indent="0">
+              <a:buNone/>
+              <a:defRPr sz="620"/>
             </a:lvl4pPr>
-            <a:lvl5pPr marL="1440180" indent="0">
-              <a:buNone/>
-              <a:defRPr sz="788"/>
+            <a:lvl5pPr marL="1134039" indent="0">
+              <a:buNone/>
+              <a:defRPr sz="620"/>
             </a:lvl5pPr>
-            <a:lvl6pPr marL="1800225" indent="0">
-              <a:buNone/>
-              <a:defRPr sz="788"/>
+            <a:lvl6pPr marL="1417549" indent="0">
+              <a:buNone/>
+              <a:defRPr sz="620"/>
             </a:lvl6pPr>
-            <a:lvl7pPr marL="2160270" indent="0">
-              <a:buNone/>
-              <a:defRPr sz="788"/>
+            <a:lvl7pPr marL="1701058" indent="0">
+              <a:buNone/>
+              <a:defRPr sz="620"/>
             </a:lvl7pPr>
-            <a:lvl8pPr marL="2520315" indent="0">
-              <a:buNone/>
-              <a:defRPr sz="788"/>
+            <a:lvl8pPr marL="1984568" indent="0">
+              <a:buNone/>
+              <a:defRPr sz="620"/>
             </a:lvl8pPr>
-            <a:lvl9pPr marL="2880360" indent="0">
-              <a:buNone/>
-              <a:defRPr sz="788"/>
+            <a:lvl9pPr marL="2268078" indent="0">
+              <a:buNone/>
+              <a:defRPr sz="620"/>
             </a:lvl9pPr>
           </a:lstStyle>
           <a:p>
@@ -2142,7 +2144,7 @@
     </p:spTree>
     <p:extLst>
       <p:ext uri="{BB962C8B-B14F-4D97-AF65-F5344CB8AC3E}">
-        <p14:creationId xmlns:p14="http://schemas.microsoft.com/office/powerpoint/2010/main" val="719355244"/>
+        <p14:creationId xmlns:p14="http://schemas.microsoft.com/office/powerpoint/2010/main" val="2566389614"/>
       </p:ext>
     </p:extLst>
   </p:cSld>
@@ -2181,15 +2183,15 @@
         </p:nvSpPr>
         <p:spPr>
           <a:xfrm>
-            <a:off x="520712" y="360045"/>
-            <a:ext cx="2438192" cy="1260158"/>
+            <a:off x="520712" y="311997"/>
+            <a:ext cx="2438192" cy="1091988"/>
           </a:xfrm>
         </p:spPr>
         <p:txBody>
           <a:bodyPr anchor="b"/>
           <a:lstStyle>
             <a:lvl1pPr>
-              <a:defRPr sz="2520"/>
+              <a:defRPr sz="1984"/>
             </a:lvl1pPr>
           </a:lstStyle>
           <a:p>
@@ -2213,8 +2215,8 @@
         </p:nvSpPr>
         <p:spPr>
           <a:xfrm>
-            <a:off x="3213847" y="777598"/>
-            <a:ext cx="3827085" cy="3837980"/>
+            <a:off x="3213847" y="673826"/>
+            <a:ext cx="3827085" cy="3325798"/>
           </a:xfrm>
         </p:spPr>
         <p:txBody>
@@ -2222,39 +2224,39 @@
           <a:lstStyle>
             <a:lvl1pPr marL="0" indent="0">
               <a:buNone/>
-              <a:defRPr sz="2520"/>
+              <a:defRPr sz="1984"/>
             </a:lvl1pPr>
-            <a:lvl2pPr marL="360045" indent="0">
-              <a:buNone/>
-              <a:defRPr sz="2205"/>
+            <a:lvl2pPr marL="283510" indent="0">
+              <a:buNone/>
+              <a:defRPr sz="1736"/>
             </a:lvl2pPr>
-            <a:lvl3pPr marL="720090" indent="0">
-              <a:buNone/>
-              <a:defRPr sz="1890"/>
+            <a:lvl3pPr marL="567019" indent="0">
+              <a:buNone/>
+              <a:defRPr sz="1488"/>
             </a:lvl3pPr>
-            <a:lvl4pPr marL="1080135" indent="0">
-              <a:buNone/>
-              <a:defRPr sz="1575"/>
+            <a:lvl4pPr marL="850529" indent="0">
+              <a:buNone/>
+              <a:defRPr sz="1240"/>
             </a:lvl4pPr>
-            <a:lvl5pPr marL="1440180" indent="0">
-              <a:buNone/>
-              <a:defRPr sz="1575"/>
+            <a:lvl5pPr marL="1134039" indent="0">
+              <a:buNone/>
+              <a:defRPr sz="1240"/>
             </a:lvl5pPr>
-            <a:lvl6pPr marL="1800225" indent="0">
-              <a:buNone/>
-              <a:defRPr sz="1575"/>
+            <a:lvl6pPr marL="1417549" indent="0">
+              <a:buNone/>
+              <a:defRPr sz="1240"/>
             </a:lvl6pPr>
-            <a:lvl7pPr marL="2160270" indent="0">
-              <a:buNone/>
-              <a:defRPr sz="1575"/>
+            <a:lvl7pPr marL="1701058" indent="0">
+              <a:buNone/>
+              <a:defRPr sz="1240"/>
             </a:lvl7pPr>
-            <a:lvl8pPr marL="2520315" indent="0">
-              <a:buNone/>
-              <a:defRPr sz="1575"/>
+            <a:lvl8pPr marL="1984568" indent="0">
+              <a:buNone/>
+              <a:defRPr sz="1240"/>
             </a:lvl8pPr>
-            <a:lvl9pPr marL="2880360" indent="0">
-              <a:buNone/>
-              <a:defRPr sz="1575"/>
+            <a:lvl9pPr marL="2268078" indent="0">
+              <a:buNone/>
+              <a:defRPr sz="1240"/>
             </a:lvl9pPr>
           </a:lstStyle>
           <a:p>
@@ -2278,8 +2280,8 @@
         </p:nvSpPr>
         <p:spPr>
           <a:xfrm>
-            <a:off x="520712" y="1620202"/>
-            <a:ext cx="2438192" cy="3001626"/>
+            <a:off x="520712" y="1403985"/>
+            <a:ext cx="2438192" cy="2601056"/>
           </a:xfrm>
         </p:spPr>
         <p:txBody>
@@ -2287,39 +2289,39 @@
           <a:lstStyle>
             <a:lvl1pPr marL="0" indent="0">
               <a:buNone/>
-              <a:defRPr sz="1260"/>
+              <a:defRPr sz="992"/>
             </a:lvl1pPr>
-            <a:lvl2pPr marL="360045" indent="0">
-              <a:buNone/>
-              <a:defRPr sz="1103"/>
+            <a:lvl2pPr marL="283510" indent="0">
+              <a:buNone/>
+              <a:defRPr sz="868"/>
             </a:lvl2pPr>
-            <a:lvl3pPr marL="720090" indent="0">
-              <a:buNone/>
-              <a:defRPr sz="945"/>
+            <a:lvl3pPr marL="567019" indent="0">
+              <a:buNone/>
+              <a:defRPr sz="744"/>
             </a:lvl3pPr>
-            <a:lvl4pPr marL="1080135" indent="0">
-              <a:buNone/>
-              <a:defRPr sz="788"/>
+            <a:lvl4pPr marL="850529" indent="0">
+              <a:buNone/>
+              <a:defRPr sz="620"/>
             </a:lvl4pPr>
-            <a:lvl5pPr marL="1440180" indent="0">
-              <a:buNone/>
-              <a:defRPr sz="788"/>
+            <a:lvl5pPr marL="1134039" indent="0">
+              <a:buNone/>
+              <a:defRPr sz="620"/>
             </a:lvl5pPr>
-            <a:lvl6pPr marL="1800225" indent="0">
-              <a:buNone/>
-              <a:defRPr sz="788"/>
+            <a:lvl6pPr marL="1417549" indent="0">
+              <a:buNone/>
+              <a:defRPr sz="620"/>
             </a:lvl6pPr>
-            <a:lvl7pPr marL="2160270" indent="0">
-              <a:buNone/>
-              <a:defRPr sz="788"/>
+            <a:lvl7pPr marL="1701058" indent="0">
+              <a:buNone/>
+              <a:defRPr sz="620"/>
             </a:lvl7pPr>
-            <a:lvl8pPr marL="2520315" indent="0">
-              <a:buNone/>
-              <a:defRPr sz="788"/>
+            <a:lvl8pPr marL="1984568" indent="0">
+              <a:buNone/>
+              <a:defRPr sz="620"/>
             </a:lvl8pPr>
-            <a:lvl9pPr marL="2880360" indent="0">
-              <a:buNone/>
-              <a:defRPr sz="788"/>
+            <a:lvl9pPr marL="2268078" indent="0">
+              <a:buNone/>
+              <a:defRPr sz="620"/>
             </a:lvl9pPr>
           </a:lstStyle>
           <a:p>
@@ -2399,7 +2401,7 @@
     </p:spTree>
     <p:extLst>
       <p:ext uri="{BB962C8B-B14F-4D97-AF65-F5344CB8AC3E}">
-        <p14:creationId xmlns:p14="http://schemas.microsoft.com/office/powerpoint/2010/main" val="2361491948"/>
+        <p14:creationId xmlns:p14="http://schemas.microsoft.com/office/powerpoint/2010/main" val="3298587027"/>
       </p:ext>
     </p:extLst>
   </p:cSld>
@@ -2443,8 +2445,8 @@
         </p:nvSpPr>
         <p:spPr>
           <a:xfrm>
-            <a:off x="519728" y="287537"/>
-            <a:ext cx="6520220" cy="1043881"/>
+            <a:off x="519728" y="249164"/>
+            <a:ext cx="6520220" cy="904574"/>
           </a:xfrm>
           <a:prstGeom prst="rect">
             <a:avLst/>
@@ -2476,8 +2478,8 @@
         </p:nvSpPr>
         <p:spPr>
           <a:xfrm>
-            <a:off x="519728" y="1437680"/>
-            <a:ext cx="6520220" cy="3426679"/>
+            <a:off x="519728" y="1245820"/>
+            <a:ext cx="6520220" cy="2969385"/>
           </a:xfrm>
           <a:prstGeom prst="rect">
             <a:avLst/>
@@ -2538,8 +2540,8 @@
         </p:nvSpPr>
         <p:spPr>
           <a:xfrm>
-            <a:off x="519728" y="5005627"/>
-            <a:ext cx="1700927" cy="287536"/>
+            <a:off x="519728" y="4337621"/>
+            <a:ext cx="1700927" cy="249164"/>
           </a:xfrm>
           <a:prstGeom prst="rect">
             <a:avLst/>
@@ -2549,7 +2551,7 @@
           <a:bodyPr vert="horz" lIns="91440" tIns="45720" rIns="91440" bIns="45720" rtlCol="0" anchor="ctr"/>
           <a:lstStyle>
             <a:lvl1pPr algn="l">
-              <a:defRPr sz="945">
+              <a:defRPr sz="744">
                 <a:solidFill>
                   <a:schemeClr val="tx1">
                     <a:tint val="75000"/>
@@ -2579,8 +2581,8 @@
         </p:nvSpPr>
         <p:spPr>
           <a:xfrm>
-            <a:off x="2504143" y="5005627"/>
-            <a:ext cx="2551390" cy="287536"/>
+            <a:off x="2504143" y="4337621"/>
+            <a:ext cx="2551390" cy="249164"/>
           </a:xfrm>
           <a:prstGeom prst="rect">
             <a:avLst/>
@@ -2590,7 +2592,7 @@
           <a:bodyPr vert="horz" lIns="91440" tIns="45720" rIns="91440" bIns="45720" rtlCol="0" anchor="ctr"/>
           <a:lstStyle>
             <a:lvl1pPr algn="ctr">
-              <a:defRPr sz="945">
+              <a:defRPr sz="744">
                 <a:solidFill>
                   <a:schemeClr val="tx1">
                     <a:tint val="75000"/>
@@ -2616,8 +2618,8 @@
         </p:nvSpPr>
         <p:spPr>
           <a:xfrm>
-            <a:off x="5339020" y="5005627"/>
-            <a:ext cx="1700927" cy="287536"/>
+            <a:off x="5339020" y="4337621"/>
+            <a:ext cx="1700927" cy="249164"/>
           </a:xfrm>
           <a:prstGeom prst="rect">
             <a:avLst/>
@@ -2627,7 +2629,7 @@
           <a:bodyPr vert="horz" lIns="91440" tIns="45720" rIns="91440" bIns="45720" rtlCol="0" anchor="ctr"/>
           <a:lstStyle>
             <a:lvl1pPr algn="r">
-              <a:defRPr sz="945">
+              <a:defRPr sz="744">
                 <a:solidFill>
                   <a:schemeClr val="tx1">
                     <a:tint val="75000"/>
@@ -2648,27 +2650,27 @@
     </p:spTree>
     <p:extLst>
       <p:ext uri="{BB962C8B-B14F-4D97-AF65-F5344CB8AC3E}">
-        <p14:creationId xmlns:p14="http://schemas.microsoft.com/office/powerpoint/2010/main" val="2008646864"/>
+        <p14:creationId xmlns:p14="http://schemas.microsoft.com/office/powerpoint/2010/main" val="2640426585"/>
       </p:ext>
     </p:extLst>
   </p:cSld>
   <p:clrMap bg1="lt1" tx1="dk1" bg2="lt2" tx2="dk2" accent1="accent1" accent2="accent2" accent3="accent3" accent4="accent4" accent5="accent5" accent6="accent6" hlink="hlink" folHlink="folHlink"/>
   <p:sldLayoutIdLst>
-    <p:sldLayoutId id="2147483733" r:id="rId1"/>
-    <p:sldLayoutId id="2147483734" r:id="rId2"/>
-    <p:sldLayoutId id="2147483735" r:id="rId3"/>
-    <p:sldLayoutId id="2147483736" r:id="rId4"/>
-    <p:sldLayoutId id="2147483737" r:id="rId5"/>
-    <p:sldLayoutId id="2147483738" r:id="rId6"/>
-    <p:sldLayoutId id="2147483739" r:id="rId7"/>
-    <p:sldLayoutId id="2147483740" r:id="rId8"/>
-    <p:sldLayoutId id="2147483741" r:id="rId9"/>
-    <p:sldLayoutId id="2147483742" r:id="rId10"/>
-    <p:sldLayoutId id="2147483743" r:id="rId11"/>
+    <p:sldLayoutId id="2147483745" r:id="rId1"/>
+    <p:sldLayoutId id="2147483746" r:id="rId2"/>
+    <p:sldLayoutId id="2147483747" r:id="rId3"/>
+    <p:sldLayoutId id="2147483748" r:id="rId4"/>
+    <p:sldLayoutId id="2147483749" r:id="rId5"/>
+    <p:sldLayoutId id="2147483750" r:id="rId6"/>
+    <p:sldLayoutId id="2147483751" r:id="rId7"/>
+    <p:sldLayoutId id="2147483752" r:id="rId8"/>
+    <p:sldLayoutId id="2147483753" r:id="rId9"/>
+    <p:sldLayoutId id="2147483754" r:id="rId10"/>
+    <p:sldLayoutId id="2147483755" r:id="rId11"/>
   </p:sldLayoutIdLst>
   <p:txStyles>
     <p:titleStyle>
-      <a:lvl1pPr algn="l" defTabSz="720090" rtl="0" eaLnBrk="1" latinLnBrk="0" hangingPunct="1">
+      <a:lvl1pPr algn="l" defTabSz="567019" rtl="0" eaLnBrk="1" latinLnBrk="0" hangingPunct="1">
         <a:lnSpc>
           <a:spcPct val="90000"/>
         </a:lnSpc>
@@ -2676,7 +2678,7 @@
           <a:spcPct val="0"/>
         </a:spcBef>
         <a:buNone/>
-        <a:defRPr sz="3465" kern="1200">
+        <a:defRPr sz="2728" kern="1200">
           <a:solidFill>
             <a:schemeClr val="tx1"/>
           </a:solidFill>
@@ -2687,16 +2689,16 @@
       </a:lvl1pPr>
     </p:titleStyle>
     <p:bodyStyle>
-      <a:lvl1pPr marL="180023" indent="-180023" algn="l" defTabSz="720090" rtl="0" eaLnBrk="1" latinLnBrk="0" hangingPunct="1">
+      <a:lvl1pPr marL="141755" indent="-141755" algn="l" defTabSz="567019" rtl="0" eaLnBrk="1" latinLnBrk="0" hangingPunct="1">
         <a:lnSpc>
           <a:spcPct val="90000"/>
         </a:lnSpc>
         <a:spcBef>
-          <a:spcPts val="788"/>
+          <a:spcPts val="620"/>
         </a:spcBef>
         <a:buFont typeface="Arial" panose="020B0604020202020204" pitchFamily="34" charset="0"/>
         <a:buChar char="•"/>
-        <a:defRPr sz="2205" kern="1200">
+        <a:defRPr sz="1736" kern="1200">
           <a:solidFill>
             <a:schemeClr val="tx1"/>
           </a:solidFill>
@@ -2705,16 +2707,16 @@
           <a:cs typeface="+mn-cs"/>
         </a:defRPr>
       </a:lvl1pPr>
-      <a:lvl2pPr marL="540068" indent="-180023" algn="l" defTabSz="720090" rtl="0" eaLnBrk="1" latinLnBrk="0" hangingPunct="1">
+      <a:lvl2pPr marL="425265" indent="-141755" algn="l" defTabSz="567019" rtl="0" eaLnBrk="1" latinLnBrk="0" hangingPunct="1">
         <a:lnSpc>
           <a:spcPct val="90000"/>
         </a:lnSpc>
         <a:spcBef>
-          <a:spcPts val="394"/>
+          <a:spcPts val="310"/>
         </a:spcBef>
         <a:buFont typeface="Arial" panose="020B0604020202020204" pitchFamily="34" charset="0"/>
         <a:buChar char="•"/>
-        <a:defRPr sz="1890" kern="1200">
+        <a:defRPr sz="1488" kern="1200">
           <a:solidFill>
             <a:schemeClr val="tx1"/>
           </a:solidFill>
@@ -2723,16 +2725,16 @@
           <a:cs typeface="+mn-cs"/>
         </a:defRPr>
       </a:lvl2pPr>
-      <a:lvl3pPr marL="900113" indent="-180023" algn="l" defTabSz="720090" rtl="0" eaLnBrk="1" latinLnBrk="0" hangingPunct="1">
+      <a:lvl3pPr marL="708774" indent="-141755" algn="l" defTabSz="567019" rtl="0" eaLnBrk="1" latinLnBrk="0" hangingPunct="1">
         <a:lnSpc>
           <a:spcPct val="90000"/>
         </a:lnSpc>
         <a:spcBef>
-          <a:spcPts val="394"/>
+          <a:spcPts val="310"/>
         </a:spcBef>
         <a:buFont typeface="Arial" panose="020B0604020202020204" pitchFamily="34" charset="0"/>
         <a:buChar char="•"/>
-        <a:defRPr sz="1575" kern="1200">
+        <a:defRPr sz="1240" kern="1200">
           <a:solidFill>
             <a:schemeClr val="tx1"/>
           </a:solidFill>
@@ -2741,16 +2743,16 @@
           <a:cs typeface="+mn-cs"/>
         </a:defRPr>
       </a:lvl3pPr>
-      <a:lvl4pPr marL="1260158" indent="-180023" algn="l" defTabSz="720090" rtl="0" eaLnBrk="1" latinLnBrk="0" hangingPunct="1">
+      <a:lvl4pPr marL="992284" indent="-141755" algn="l" defTabSz="567019" rtl="0" eaLnBrk="1" latinLnBrk="0" hangingPunct="1">
         <a:lnSpc>
           <a:spcPct val="90000"/>
         </a:lnSpc>
         <a:spcBef>
-          <a:spcPts val="394"/>
+          <a:spcPts val="310"/>
         </a:spcBef>
         <a:buFont typeface="Arial" panose="020B0604020202020204" pitchFamily="34" charset="0"/>
         <a:buChar char="•"/>
-        <a:defRPr sz="1418" kern="1200">
+        <a:defRPr sz="1116" kern="1200">
           <a:solidFill>
             <a:schemeClr val="tx1"/>
           </a:solidFill>
@@ -2759,16 +2761,16 @@
           <a:cs typeface="+mn-cs"/>
         </a:defRPr>
       </a:lvl4pPr>
-      <a:lvl5pPr marL="1620203" indent="-180023" algn="l" defTabSz="720090" rtl="0" eaLnBrk="1" latinLnBrk="0" hangingPunct="1">
+      <a:lvl5pPr marL="1275794" indent="-141755" algn="l" defTabSz="567019" rtl="0" eaLnBrk="1" latinLnBrk="0" hangingPunct="1">
         <a:lnSpc>
           <a:spcPct val="90000"/>
         </a:lnSpc>
         <a:spcBef>
-          <a:spcPts val="394"/>
+          <a:spcPts val="310"/>
         </a:spcBef>
         <a:buFont typeface="Arial" panose="020B0604020202020204" pitchFamily="34" charset="0"/>
         <a:buChar char="•"/>
-        <a:defRPr sz="1418" kern="1200">
+        <a:defRPr sz="1116" kern="1200">
           <a:solidFill>
             <a:schemeClr val="tx1"/>
           </a:solidFill>
@@ -2777,16 +2779,16 @@
           <a:cs typeface="+mn-cs"/>
         </a:defRPr>
       </a:lvl5pPr>
-      <a:lvl6pPr marL="1980248" indent="-180023" algn="l" defTabSz="720090" rtl="0" eaLnBrk="1" latinLnBrk="0" hangingPunct="1">
+      <a:lvl6pPr marL="1559303" indent="-141755" algn="l" defTabSz="567019" rtl="0" eaLnBrk="1" latinLnBrk="0" hangingPunct="1">
         <a:lnSpc>
           <a:spcPct val="90000"/>
         </a:lnSpc>
         <a:spcBef>
-          <a:spcPts val="394"/>
+          <a:spcPts val="310"/>
         </a:spcBef>
         <a:buFont typeface="Arial" panose="020B0604020202020204" pitchFamily="34" charset="0"/>
         <a:buChar char="•"/>
-        <a:defRPr sz="1418" kern="1200">
+        <a:defRPr sz="1116" kern="1200">
           <a:solidFill>
             <a:schemeClr val="tx1"/>
           </a:solidFill>
@@ -2795,16 +2797,16 @@
           <a:cs typeface="+mn-cs"/>
         </a:defRPr>
       </a:lvl6pPr>
-      <a:lvl7pPr marL="2340293" indent="-180023" algn="l" defTabSz="720090" rtl="0" eaLnBrk="1" latinLnBrk="0" hangingPunct="1">
+      <a:lvl7pPr marL="1842813" indent="-141755" algn="l" defTabSz="567019" rtl="0" eaLnBrk="1" latinLnBrk="0" hangingPunct="1">
         <a:lnSpc>
           <a:spcPct val="90000"/>
         </a:lnSpc>
         <a:spcBef>
-          <a:spcPts val="394"/>
+          <a:spcPts val="310"/>
         </a:spcBef>
         <a:buFont typeface="Arial" panose="020B0604020202020204" pitchFamily="34" charset="0"/>
         <a:buChar char="•"/>
-        <a:defRPr sz="1418" kern="1200">
+        <a:defRPr sz="1116" kern="1200">
           <a:solidFill>
             <a:schemeClr val="tx1"/>
           </a:solidFill>
@@ -2813,16 +2815,16 @@
           <a:cs typeface="+mn-cs"/>
         </a:defRPr>
       </a:lvl7pPr>
-      <a:lvl8pPr marL="2700338" indent="-180023" algn="l" defTabSz="720090" rtl="0" eaLnBrk="1" latinLnBrk="0" hangingPunct="1">
+      <a:lvl8pPr marL="2126323" indent="-141755" algn="l" defTabSz="567019" rtl="0" eaLnBrk="1" latinLnBrk="0" hangingPunct="1">
         <a:lnSpc>
           <a:spcPct val="90000"/>
         </a:lnSpc>
         <a:spcBef>
-          <a:spcPts val="394"/>
+          <a:spcPts val="310"/>
         </a:spcBef>
         <a:buFont typeface="Arial" panose="020B0604020202020204" pitchFamily="34" charset="0"/>
         <a:buChar char="•"/>
-        <a:defRPr sz="1418" kern="1200">
+        <a:defRPr sz="1116" kern="1200">
           <a:solidFill>
             <a:schemeClr val="tx1"/>
           </a:solidFill>
@@ -2831,16 +2833,16 @@
           <a:cs typeface="+mn-cs"/>
         </a:defRPr>
       </a:lvl8pPr>
-      <a:lvl9pPr marL="3060383" indent="-180023" algn="l" defTabSz="720090" rtl="0" eaLnBrk="1" latinLnBrk="0" hangingPunct="1">
+      <a:lvl9pPr marL="2409833" indent="-141755" algn="l" defTabSz="567019" rtl="0" eaLnBrk="1" latinLnBrk="0" hangingPunct="1">
         <a:lnSpc>
           <a:spcPct val="90000"/>
         </a:lnSpc>
         <a:spcBef>
-          <a:spcPts val="394"/>
+          <a:spcPts val="310"/>
         </a:spcBef>
         <a:buFont typeface="Arial" panose="020B0604020202020204" pitchFamily="34" charset="0"/>
         <a:buChar char="•"/>
-        <a:defRPr sz="1418" kern="1200">
+        <a:defRPr sz="1116" kern="1200">
           <a:solidFill>
             <a:schemeClr val="tx1"/>
           </a:solidFill>
@@ -2854,8 +2856,8 @@
       <a:defPPr>
         <a:defRPr lang="en-US"/>
       </a:defPPr>
-      <a:lvl1pPr marL="0" algn="l" defTabSz="720090" rtl="0" eaLnBrk="1" latinLnBrk="0" hangingPunct="1">
-        <a:defRPr sz="1418" kern="1200">
+      <a:lvl1pPr marL="0" algn="l" defTabSz="567019" rtl="0" eaLnBrk="1" latinLnBrk="0" hangingPunct="1">
+        <a:defRPr sz="1116" kern="1200">
           <a:solidFill>
             <a:schemeClr val="tx1"/>
           </a:solidFill>
@@ -2864,8 +2866,8 @@
           <a:cs typeface="+mn-cs"/>
         </a:defRPr>
       </a:lvl1pPr>
-      <a:lvl2pPr marL="360045" algn="l" defTabSz="720090" rtl="0" eaLnBrk="1" latinLnBrk="0" hangingPunct="1">
-        <a:defRPr sz="1418" kern="1200">
+      <a:lvl2pPr marL="283510" algn="l" defTabSz="567019" rtl="0" eaLnBrk="1" latinLnBrk="0" hangingPunct="1">
+        <a:defRPr sz="1116" kern="1200">
           <a:solidFill>
             <a:schemeClr val="tx1"/>
           </a:solidFill>
@@ -2874,8 +2876,8 @@
           <a:cs typeface="+mn-cs"/>
         </a:defRPr>
       </a:lvl2pPr>
-      <a:lvl3pPr marL="720090" algn="l" defTabSz="720090" rtl="0" eaLnBrk="1" latinLnBrk="0" hangingPunct="1">
-        <a:defRPr sz="1418" kern="1200">
+      <a:lvl3pPr marL="567019" algn="l" defTabSz="567019" rtl="0" eaLnBrk="1" latinLnBrk="0" hangingPunct="1">
+        <a:defRPr sz="1116" kern="1200">
           <a:solidFill>
             <a:schemeClr val="tx1"/>
           </a:solidFill>
@@ -2884,8 +2886,8 @@
           <a:cs typeface="+mn-cs"/>
         </a:defRPr>
       </a:lvl3pPr>
-      <a:lvl4pPr marL="1080135" algn="l" defTabSz="720090" rtl="0" eaLnBrk="1" latinLnBrk="0" hangingPunct="1">
-        <a:defRPr sz="1418" kern="1200">
+      <a:lvl4pPr marL="850529" algn="l" defTabSz="567019" rtl="0" eaLnBrk="1" latinLnBrk="0" hangingPunct="1">
+        <a:defRPr sz="1116" kern="1200">
           <a:solidFill>
             <a:schemeClr val="tx1"/>
           </a:solidFill>
@@ -2894,8 +2896,8 @@
           <a:cs typeface="+mn-cs"/>
         </a:defRPr>
       </a:lvl4pPr>
-      <a:lvl5pPr marL="1440180" algn="l" defTabSz="720090" rtl="0" eaLnBrk="1" latinLnBrk="0" hangingPunct="1">
-        <a:defRPr sz="1418" kern="1200">
+      <a:lvl5pPr marL="1134039" algn="l" defTabSz="567019" rtl="0" eaLnBrk="1" latinLnBrk="0" hangingPunct="1">
+        <a:defRPr sz="1116" kern="1200">
           <a:solidFill>
             <a:schemeClr val="tx1"/>
           </a:solidFill>
@@ -2904,8 +2906,8 @@
           <a:cs typeface="+mn-cs"/>
         </a:defRPr>
       </a:lvl5pPr>
-      <a:lvl6pPr marL="1800225" algn="l" defTabSz="720090" rtl="0" eaLnBrk="1" latinLnBrk="0" hangingPunct="1">
-        <a:defRPr sz="1418" kern="1200">
+      <a:lvl6pPr marL="1417549" algn="l" defTabSz="567019" rtl="0" eaLnBrk="1" latinLnBrk="0" hangingPunct="1">
+        <a:defRPr sz="1116" kern="1200">
           <a:solidFill>
             <a:schemeClr val="tx1"/>
           </a:solidFill>
@@ -2914,8 +2916,8 @@
           <a:cs typeface="+mn-cs"/>
         </a:defRPr>
       </a:lvl6pPr>
-      <a:lvl7pPr marL="2160270" algn="l" defTabSz="720090" rtl="0" eaLnBrk="1" latinLnBrk="0" hangingPunct="1">
-        <a:defRPr sz="1418" kern="1200">
+      <a:lvl7pPr marL="1701058" algn="l" defTabSz="567019" rtl="0" eaLnBrk="1" latinLnBrk="0" hangingPunct="1">
+        <a:defRPr sz="1116" kern="1200">
           <a:solidFill>
             <a:schemeClr val="tx1"/>
           </a:solidFill>
@@ -2924,8 +2926,8 @@
           <a:cs typeface="+mn-cs"/>
         </a:defRPr>
       </a:lvl7pPr>
-      <a:lvl8pPr marL="2520315" algn="l" defTabSz="720090" rtl="0" eaLnBrk="1" latinLnBrk="0" hangingPunct="1">
-        <a:defRPr sz="1418" kern="1200">
+      <a:lvl8pPr marL="1984568" algn="l" defTabSz="567019" rtl="0" eaLnBrk="1" latinLnBrk="0" hangingPunct="1">
+        <a:defRPr sz="1116" kern="1200">
           <a:solidFill>
             <a:schemeClr val="tx1"/>
           </a:solidFill>
@@ -2934,8 +2936,8 @@
           <a:cs typeface="+mn-cs"/>
         </a:defRPr>
       </a:lvl8pPr>
-      <a:lvl9pPr marL="2880360" algn="l" defTabSz="720090" rtl="0" eaLnBrk="1" latinLnBrk="0" hangingPunct="1">
-        <a:defRPr sz="1418" kern="1200">
+      <a:lvl9pPr marL="2268078" algn="l" defTabSz="567019" rtl="0" eaLnBrk="1" latinLnBrk="0" hangingPunct="1">
+        <a:defRPr sz="1116" kern="1200">
           <a:solidFill>
             <a:schemeClr val="tx1"/>
           </a:solidFill>
@@ -2981,14 +2983,14 @@
           <p:nvPr>
             <p:extLst>
               <p:ext uri="{D42A27DB-BD31-4B8C-83A1-F6EECF244321}">
-                <p14:modId xmlns:p14="http://schemas.microsoft.com/office/powerpoint/2010/main" val="3123595343"/>
+                <p14:modId xmlns:p14="http://schemas.microsoft.com/office/powerpoint/2010/main" val="184408981"/>
               </p:ext>
             </p:extLst>
           </p:nvPr>
         </p:nvGraphicFramePr>
         <p:xfrm>
-          <a:off x="101601" y="36687"/>
-          <a:ext cx="7342186" cy="5328268"/>
+          <a:off x="94459" y="147813"/>
+          <a:ext cx="7342186" cy="4371008"/>
         </p:xfrm>
         <a:graphic>
           <a:graphicData uri="http://schemas.openxmlformats.org/drawingml/2006/table">
@@ -3011,28 +3013,28 @@
                     </a:ext>
                   </a:extLst>
                 </a:gridCol>
-                <a:gridCol w="1296823">
+                <a:gridCol w="917884">
                   <a:extLst>
                     <a:ext uri="{9D8B030D-6E8A-4147-A177-3AD203B41FA5}">
                       <a16:colId xmlns:a16="http://schemas.microsoft.com/office/drawing/2014/main" val="3134327971"/>
                     </a:ext>
                   </a:extLst>
                 </a:gridCol>
-                <a:gridCol w="1041829">
+                <a:gridCol w="1785937">
                   <a:extLst>
                     <a:ext uri="{9D8B030D-6E8A-4147-A177-3AD203B41FA5}">
                       <a16:colId xmlns:a16="http://schemas.microsoft.com/office/drawing/2014/main" val="1835070128"/>
                     </a:ext>
                   </a:extLst>
                 </a:gridCol>
-                <a:gridCol w="1629611">
+                <a:gridCol w="1457325">
                   <a:extLst>
                     <a:ext uri="{9D8B030D-6E8A-4147-A177-3AD203B41FA5}">
                       <a16:colId xmlns:a16="http://schemas.microsoft.com/office/drawing/2014/main" val="208777718"/>
                     </a:ext>
                   </a:extLst>
                 </a:gridCol>
-                <a:gridCol w="1350170">
+                <a:gridCol w="1157287">
                   <a:extLst>
                     <a:ext uri="{9D8B030D-6E8A-4147-A177-3AD203B41FA5}">
                       <a16:colId xmlns:a16="http://schemas.microsoft.com/office/drawing/2014/main" val="676365462"/>
@@ -3040,7 +3042,7 @@
                   </a:extLst>
                 </a:gridCol>
               </a:tblGrid>
-              <a:tr h="851640">
+              <a:tr h="828598">
                 <a:tc>
                   <a:txBody>
                     <a:bodyPr/>
@@ -3055,12 +3057,12 @@
                         </a:spcAft>
                       </a:pPr>
                       <a:r>
-                        <a:rPr lang="en-AU" sz="900" dirty="0">
+                        <a:rPr lang="en-AU" sz="1000" dirty="0">
                           <a:effectLst/>
                         </a:rPr>
                         <a:t>Thesis Chapter</a:t>
                       </a:r>
-                      <a:endParaRPr lang="en-AU" sz="900" dirty="0">
+                      <a:endParaRPr lang="en-AU" sz="1000" dirty="0">
                         <a:effectLst/>
                         <a:latin typeface="Cambria" panose="02040503050406030204" pitchFamily="18" charset="0"/>
                         <a:ea typeface="MS Mincho" panose="02020609040205080304" pitchFamily="49" charset="-128"/>
@@ -3068,7 +3070,26 @@
                       </a:endParaRPr>
                     </a:p>
                   </a:txBody>
-                  <a:tcPr marL="20629" marR="20629" marT="0" marB="0" vert="vert270" anchor="ctr"/>
+                  <a:tcPr marL="20629" marR="20629" marT="0" marB="0" vert="vert270" anchor="ctr">
+                    <a:lnL w="12700" cap="flat" cmpd="sng" algn="ctr">
+                      <a:solidFill>
+                        <a:schemeClr val="tx1"/>
+                      </a:solidFill>
+                      <a:prstDash val="solid"/>
+                      <a:round/>
+                      <a:headEnd type="none" w="med" len="med"/>
+                      <a:tailEnd type="none" w="med" len="med"/>
+                    </a:lnL>
+                    <a:lnT w="12700" cap="flat" cmpd="sng" algn="ctr">
+                      <a:solidFill>
+                        <a:schemeClr val="tx1"/>
+                      </a:solidFill>
+                      <a:prstDash val="solid"/>
+                      <a:round/>
+                      <a:headEnd type="none" w="med" len="med"/>
+                      <a:tailEnd type="none" w="med" len="med"/>
+                    </a:lnT>
+                  </a:tcPr>
                 </a:tc>
                 <a:tc>
                   <a:txBody>
@@ -3084,12 +3105,12 @@
                         </a:spcAft>
                       </a:pPr>
                       <a:r>
-                        <a:rPr lang="en-AU" sz="900" dirty="0">
+                        <a:rPr lang="en-AU" sz="1000" dirty="0">
                           <a:effectLst/>
                         </a:rPr>
                         <a:t>Publication Title</a:t>
                       </a:r>
-                      <a:endParaRPr lang="en-AU" sz="900" dirty="0">
+                      <a:endParaRPr lang="en-AU" sz="1000" dirty="0">
                         <a:effectLst/>
                         <a:latin typeface="Cambria" panose="02040503050406030204" pitchFamily="18" charset="0"/>
                         <a:ea typeface="MS Mincho" panose="02020609040205080304" pitchFamily="49" charset="-128"/>
@@ -3097,7 +3118,17 @@
                       </a:endParaRPr>
                     </a:p>
                   </a:txBody>
-                  <a:tcPr marL="20629" marR="20629" marT="0" marB="0" vert="vert270" anchor="ctr"/>
+                  <a:tcPr marL="20629" marR="20629" marT="0" marB="0" vert="vert270" anchor="ctr">
+                    <a:lnT w="12700" cap="flat" cmpd="sng" algn="ctr">
+                      <a:solidFill>
+                        <a:schemeClr val="tx1"/>
+                      </a:solidFill>
+                      <a:prstDash val="solid"/>
+                      <a:round/>
+                      <a:headEnd type="none" w="med" len="med"/>
+                      <a:tailEnd type="none" w="med" len="med"/>
+                    </a:lnT>
+                  </a:tcPr>
                 </a:tc>
                 <a:tc>
                   <a:txBody>
@@ -3113,12 +3144,12 @@
                         </a:spcAft>
                       </a:pPr>
                       <a:r>
-                        <a:rPr lang="en-AU" sz="900" dirty="0">
-                          <a:effectLst/>
-                        </a:rPr>
-                        <a:t>Status (published, in press, accepted or returned for revision)</a:t>
-                      </a:r>
-                      <a:endParaRPr lang="en-AU" sz="900" dirty="0">
+                        <a:rPr lang="en-AU" sz="1000" dirty="0">
+                          <a:effectLst/>
+                        </a:rPr>
+                        <a:t>Status</a:t>
+                      </a:r>
+                      <a:endParaRPr lang="en-AU" sz="1000" dirty="0">
                         <a:effectLst/>
                         <a:latin typeface="Cambria" panose="02040503050406030204" pitchFamily="18" charset="0"/>
                         <a:ea typeface="MS Mincho" panose="02020609040205080304" pitchFamily="49" charset="-128"/>
@@ -3126,7 +3157,17 @@
                       </a:endParaRPr>
                     </a:p>
                   </a:txBody>
-                  <a:tcPr marL="20629" marR="20629" marT="0" marB="0" vert="vert270" anchor="ctr"/>
+                  <a:tcPr marL="20629" marR="20629" marT="0" marB="0" vert="vert270" anchor="ctr">
+                    <a:lnT w="12700" cap="flat" cmpd="sng" algn="ctr">
+                      <a:solidFill>
+                        <a:schemeClr val="tx1"/>
+                      </a:solidFill>
+                      <a:prstDash val="solid"/>
+                      <a:round/>
+                      <a:headEnd type="none" w="med" len="med"/>
+                      <a:tailEnd type="none" w="med" len="med"/>
+                    </a:lnT>
+                  </a:tcPr>
                 </a:tc>
                 <a:tc>
                   <a:txBody>
@@ -3142,12 +3183,12 @@
                         </a:spcAft>
                       </a:pPr>
                       <a:r>
-                        <a:rPr lang="en-AU" sz="900" dirty="0">
+                        <a:rPr lang="en-AU" sz="1000" dirty="0">
                           <a:effectLst/>
                         </a:rPr>
                         <a:t>Nature and % of student contribution</a:t>
                       </a:r>
-                      <a:endParaRPr lang="en-AU" sz="900" dirty="0">
+                      <a:endParaRPr lang="en-AU" sz="1000" dirty="0">
                         <a:effectLst/>
                         <a:latin typeface="Cambria" panose="02040503050406030204" pitchFamily="18" charset="0"/>
                         <a:ea typeface="MS Mincho" panose="02020609040205080304" pitchFamily="49" charset="-128"/>
@@ -3155,7 +3196,17 @@
                       </a:endParaRPr>
                     </a:p>
                   </a:txBody>
-                  <a:tcPr marL="20629" marR="20629" marT="0" marB="0" vert="vert270" anchor="ctr"/>
+                  <a:tcPr marL="20629" marR="20629" marT="0" marB="0" vert="vert270" anchor="ctr">
+                    <a:lnT w="12700" cap="flat" cmpd="sng" algn="ctr">
+                      <a:solidFill>
+                        <a:schemeClr val="tx1"/>
+                      </a:solidFill>
+                      <a:prstDash val="solid"/>
+                      <a:round/>
+                      <a:headEnd type="none" w="med" len="med"/>
+                      <a:tailEnd type="none" w="med" len="med"/>
+                    </a:lnT>
+                  </a:tcPr>
                 </a:tc>
                 <a:tc>
                   <a:txBody>
@@ -3171,12 +3222,12 @@
                         </a:spcAft>
                       </a:pPr>
                       <a:r>
-                        <a:rPr lang="en-AU" sz="900" dirty="0">
+                        <a:rPr lang="en-AU" sz="1000" dirty="0">
                           <a:effectLst/>
                         </a:rPr>
                         <a:t>Co-author name(s) Nature and % of Co-authors’ contribution*</a:t>
                       </a:r>
-                      <a:endParaRPr lang="en-AU" sz="900" dirty="0">
+                      <a:endParaRPr lang="en-AU" sz="1000" dirty="0">
                         <a:effectLst/>
                         <a:latin typeface="Cambria" panose="02040503050406030204" pitchFamily="18" charset="0"/>
                         <a:ea typeface="MS Mincho" panose="02020609040205080304" pitchFamily="49" charset="-128"/>
@@ -3184,7 +3235,17 @@
                       </a:endParaRPr>
                     </a:p>
                   </a:txBody>
-                  <a:tcPr marL="20629" marR="20629" marT="0" marB="0" vert="vert270" anchor="ctr"/>
+                  <a:tcPr marL="20629" marR="20629" marT="0" marB="0" vert="vert270" anchor="ctr">
+                    <a:lnT w="12700" cap="flat" cmpd="sng" algn="ctr">
+                      <a:solidFill>
+                        <a:schemeClr val="tx1"/>
+                      </a:solidFill>
+                      <a:prstDash val="solid"/>
+                      <a:round/>
+                      <a:headEnd type="none" w="med" len="med"/>
+                      <a:tailEnd type="none" w="med" len="med"/>
+                    </a:lnT>
+                  </a:tcPr>
                 </a:tc>
                 <a:tc>
                   <a:txBody>
@@ -3200,12 +3261,12 @@
                         </a:spcAft>
                       </a:pPr>
                       <a:r>
-                        <a:rPr lang="en-AU" sz="900" dirty="0">
+                        <a:rPr lang="en-AU" sz="1000" dirty="0">
                           <a:effectLst/>
                         </a:rPr>
                         <a:t>Co-author(s), Monash student Y/N*</a:t>
                       </a:r>
-                      <a:endParaRPr lang="en-AU" sz="900" dirty="0">
+                      <a:endParaRPr lang="en-AU" sz="1000" dirty="0">
                         <a:effectLst/>
                         <a:latin typeface="Cambria" panose="02040503050406030204" pitchFamily="18" charset="0"/>
                         <a:ea typeface="MS Mincho" panose="02020609040205080304" pitchFamily="49" charset="-128"/>
@@ -3213,7 +3274,26 @@
                       </a:endParaRPr>
                     </a:p>
                   </a:txBody>
-                  <a:tcPr marL="20629" marR="20629" marT="0" marB="0" vert="vert270" anchor="ctr"/>
+                  <a:tcPr marL="20629" marR="20629" marT="0" marB="0" vert="vert270" anchor="ctr">
+                    <a:lnR w="12700" cap="flat" cmpd="sng" algn="ctr">
+                      <a:solidFill>
+                        <a:schemeClr val="tx1"/>
+                      </a:solidFill>
+                      <a:prstDash val="solid"/>
+                      <a:round/>
+                      <a:headEnd type="none" w="med" len="med"/>
+                      <a:tailEnd type="none" w="med" len="med"/>
+                    </a:lnR>
+                    <a:lnT w="12700" cap="flat" cmpd="sng" algn="ctr">
+                      <a:solidFill>
+                        <a:schemeClr val="tx1"/>
+                      </a:solidFill>
+                      <a:prstDash val="solid"/>
+                      <a:round/>
+                      <a:headEnd type="none" w="med" len="med"/>
+                      <a:tailEnd type="none" w="med" len="med"/>
+                    </a:lnT>
+                  </a:tcPr>
                 </a:tc>
                 <a:extLst>
                   <a:ext uri="{0D108BD9-81ED-4DB2-BD59-A6C34878D82A}">
@@ -3221,13 +3301,13 @@
                   </a:ext>
                 </a:extLst>
               </a:tr>
-              <a:tr h="1178826">
+              <a:tr h="956731">
                 <a:tc>
                   <a:txBody>
                     <a:bodyPr/>
                     <a:lstStyle/>
                     <a:p>
-                      <a:pPr algn="ctr">
+                      <a:pPr algn="r">
                         <a:lnSpc>
                           <a:spcPct val="150000"/>
                         </a:lnSpc>
@@ -3236,12 +3316,12 @@
                         </a:spcAft>
                       </a:pPr>
                       <a:r>
-                        <a:rPr lang="en-AU" sz="1100" dirty="0">
+                        <a:rPr lang="en-AU" sz="1000" dirty="0">
                           <a:effectLst/>
                         </a:rPr>
                         <a:t>2</a:t>
                       </a:r>
-                      <a:endParaRPr lang="en-AU" sz="1100" dirty="0">
+                      <a:endParaRPr lang="en-AU" sz="1000" dirty="0">
                         <a:effectLst/>
                         <a:latin typeface="Cambria" panose="02040503050406030204" pitchFamily="18" charset="0"/>
                         <a:ea typeface="MS Mincho" panose="02020609040205080304" pitchFamily="49" charset="-128"/>
@@ -3249,13 +3329,24 @@
                       </a:endParaRPr>
                     </a:p>
                   </a:txBody>
-                  <a:tcPr marL="20629" marR="20629" marT="0" marB="0"/>
+                  <a:tcPr marL="20629" marR="20629" marT="0" marB="0">
+                    <a:lnL w="12700" cap="flat" cmpd="sng" algn="ctr">
+                      <a:solidFill>
+                        <a:schemeClr val="tx1"/>
+                      </a:solidFill>
+                      <a:prstDash val="solid"/>
+                      <a:round/>
+                      <a:headEnd type="none" w="med" len="med"/>
+                      <a:tailEnd type="none" w="med" len="med"/>
+                    </a:lnL>
+                  </a:tcPr>
                 </a:tc>
                 <a:tc>
                   <a:txBody>
                     <a:bodyPr/>
                     <a:lstStyle/>
                     <a:p>
+                      <a:pPr algn="l"/>
                       <a:r>
                         <a:rPr lang="en-AU" sz="1100" b="0" i="0" kern="1200" dirty="0">
                           <a:solidFill>
@@ -3315,7 +3406,7 @@
                     <a:bodyPr/>
                     <a:lstStyle/>
                     <a:p>
-                      <a:pPr>
+                      <a:pPr algn="just">
                         <a:lnSpc>
                           <a:spcPct val="150000"/>
                         </a:lnSpc>
@@ -3356,18 +3447,17 @@
                         </a:spcAft>
                       </a:pPr>
                       <a:r>
-                        <a:rPr lang="en-AU" sz="1100" dirty="0">
+                        <a:rPr lang="en-AU" sz="1100" b="0" i="0" kern="1200" dirty="0">
+                          <a:solidFill>
+                            <a:schemeClr val="dk1"/>
+                          </a:solidFill>
                           <a:effectLst/>
                           <a:latin typeface="+mj-lt"/>
-                        </a:rPr>
-                        <a:t>As above; 45%</a:t>
-                      </a:r>
-                      <a:endParaRPr lang="en-AU" sz="1100" dirty="0">
-                        <a:effectLst/>
-                        <a:latin typeface="+mj-lt"/>
-                        <a:ea typeface="MS Mincho" panose="02020609040205080304" pitchFamily="49" charset="-128"/>
-                        <a:cs typeface="Times New Roman" panose="02020603050405020304" pitchFamily="18" charset="0"/>
-                      </a:endParaRPr>
+                          <a:ea typeface="+mn-ea"/>
+                          <a:cs typeface="+mn-cs"/>
+                        </a:rPr>
+                        <a:t>45% - Concept &amp; design, data analysis, writing of manuscript </a:t>
+                      </a:r>
                     </a:p>
                   </a:txBody>
                   <a:tcPr marL="20629" marR="20629" marT="0" marB="0">
@@ -3490,6 +3580,15 @@
                     </a:p>
                   </a:txBody>
                   <a:tcPr marL="20629" marR="20629" marT="0" marB="0">
+                    <a:lnR w="12700" cap="flat" cmpd="sng" algn="ctr">
+                      <a:solidFill>
+                        <a:schemeClr val="tx1"/>
+                      </a:solidFill>
+                      <a:prstDash val="solid"/>
+                      <a:round/>
+                      <a:headEnd type="none" w="med" len="med"/>
+                      <a:tailEnd type="none" w="med" len="med"/>
+                    </a:lnR>
                     <a:noFill/>
                   </a:tcPr>
                 </a:tc>
@@ -3499,13 +3598,13 @@
                   </a:ext>
                 </a:extLst>
               </a:tr>
-              <a:tr h="940150">
+              <a:tr h="799304">
                 <a:tc>
                   <a:txBody>
                     <a:bodyPr/>
                     <a:lstStyle/>
                     <a:p>
-                      <a:pPr marL="0" algn="ctr" defTabSz="719907" rtl="0" eaLnBrk="1" latinLnBrk="0" hangingPunct="1">
+                      <a:pPr marL="0" algn="r" defTabSz="719907" rtl="0" eaLnBrk="1" latinLnBrk="0" hangingPunct="1">
                         <a:lnSpc>
                           <a:spcPct val="150000"/>
                         </a:lnSpc>
@@ -3514,7 +3613,7 @@
                         </a:spcAft>
                       </a:pPr>
                       <a:r>
-                        <a:rPr lang="en-AU" sz="1100" b="1" kern="1200" dirty="0">
+                        <a:rPr lang="en-AU" sz="1000" b="1" kern="1200" dirty="0">
                           <a:solidFill>
                             <a:schemeClr val="lt1"/>
                           </a:solidFill>
@@ -3527,13 +3626,24 @@
                       </a:r>
                     </a:p>
                   </a:txBody>
-                  <a:tcPr marL="20629" marR="20629" marT="0" marB="0"/>
+                  <a:tcPr marL="20629" marR="20629" marT="0" marB="0">
+                    <a:lnL w="12700" cap="flat" cmpd="sng" algn="ctr">
+                      <a:solidFill>
+                        <a:schemeClr val="tx1"/>
+                      </a:solidFill>
+                      <a:prstDash val="solid"/>
+                      <a:round/>
+                      <a:headEnd type="none" w="med" len="med"/>
+                      <a:tailEnd type="none" w="med" len="med"/>
+                    </a:lnL>
+                  </a:tcPr>
                 </a:tc>
                 <a:tc>
                   <a:txBody>
                     <a:bodyPr/>
                     <a:lstStyle/>
                     <a:p>
+                      <a:pPr algn="l"/>
                       <a:r>
                         <a:rPr lang="en-AU" sz="1100" b="0" i="0" kern="1200" dirty="0">
                           <a:solidFill>
@@ -3557,7 +3667,7 @@
                     <a:bodyPr/>
                     <a:lstStyle/>
                     <a:p>
-                      <a:pPr>
+                      <a:pPr algn="just">
                         <a:lnSpc>
                           <a:spcPct val="150000"/>
                         </a:lnSpc>
@@ -3598,18 +3708,17 @@
                         </a:spcAft>
                       </a:pPr>
                       <a:r>
-                        <a:rPr lang="en-AU" sz="1100" dirty="0">
+                        <a:rPr lang="en-AU" sz="1100" b="0" i="0" kern="1200" dirty="0">
+                          <a:solidFill>
+                            <a:schemeClr val="dk1"/>
+                          </a:solidFill>
                           <a:effectLst/>
                           <a:latin typeface="+mj-lt"/>
-                        </a:rPr>
-                        <a:t>As above; 85%</a:t>
-                      </a:r>
-                      <a:endParaRPr lang="en-AU" sz="1100" dirty="0">
-                        <a:effectLst/>
-                        <a:latin typeface="+mj-lt"/>
-                        <a:ea typeface="MS Mincho" panose="02020609040205080304" pitchFamily="49" charset="-128"/>
-                        <a:cs typeface="Times New Roman" panose="02020603050405020304" pitchFamily="18" charset="0"/>
-                      </a:endParaRPr>
+                          <a:ea typeface="+mn-ea"/>
+                          <a:cs typeface="+mn-cs"/>
+                        </a:rPr>
+                        <a:t>80% - Concept &amp; design, writing of manuscript </a:t>
+                      </a:r>
                     </a:p>
                   </a:txBody>
                   <a:tcPr marL="20629" marR="20629" marT="0" marB="0">
@@ -3634,7 +3743,7 @@
                           <a:effectLst/>
                           <a:latin typeface="+mj-lt"/>
                         </a:rPr>
-                        <a:t>1. Fulcher, BD. – 5%</a:t>
+                        <a:t>1. Fulcher, BD. – 10%</a:t>
                       </a:r>
                     </a:p>
                     <a:p>
@@ -3702,6 +3811,15 @@
                     </a:p>
                   </a:txBody>
                   <a:tcPr marL="20629" marR="20629" marT="0" marB="0">
+                    <a:lnR w="12700" cap="flat" cmpd="sng" algn="ctr">
+                      <a:solidFill>
+                        <a:schemeClr val="tx1"/>
+                      </a:solidFill>
+                      <a:prstDash val="solid"/>
+                      <a:round/>
+                      <a:headEnd type="none" w="med" len="med"/>
+                      <a:tailEnd type="none" w="med" len="med"/>
+                    </a:lnR>
                     <a:noFill/>
                   </a:tcPr>
                 </a:tc>
@@ -3711,13 +3829,13 @@
                   </a:ext>
                 </a:extLst>
               </a:tr>
-              <a:tr h="1178826">
+              <a:tr h="639443">
                 <a:tc>
                   <a:txBody>
                     <a:bodyPr/>
                     <a:lstStyle/>
                     <a:p>
-                      <a:pPr marL="0" algn="ctr" defTabSz="719907" rtl="0" eaLnBrk="1" latinLnBrk="0" hangingPunct="1">
+                      <a:pPr marL="0" algn="r" defTabSz="719907" rtl="0" eaLnBrk="1" latinLnBrk="0" hangingPunct="1">
                         <a:lnSpc>
                           <a:spcPct val="150000"/>
                         </a:lnSpc>
@@ -3726,7 +3844,7 @@
                         </a:spcAft>
                       </a:pPr>
                       <a:r>
-                        <a:rPr lang="en-AU" sz="1100" b="1" kern="1200" dirty="0">
+                        <a:rPr lang="en-AU" sz="1000" b="1" kern="1200" dirty="0">
                           <a:solidFill>
                             <a:schemeClr val="lt1"/>
                           </a:solidFill>
@@ -3739,14 +3857,24 @@
                       </a:r>
                     </a:p>
                   </a:txBody>
-                  <a:tcPr marL="20629" marR="20629" marT="0" marB="0"/>
+                  <a:tcPr marL="20629" marR="20629" marT="0" marB="0">
+                    <a:lnL w="12700" cap="flat" cmpd="sng" algn="ctr">
+                      <a:solidFill>
+                        <a:schemeClr val="tx1"/>
+                      </a:solidFill>
+                      <a:prstDash val="solid"/>
+                      <a:round/>
+                      <a:headEnd type="none" w="med" len="med"/>
+                      <a:tailEnd type="none" w="med" len="med"/>
+                    </a:lnL>
+                  </a:tcPr>
                 </a:tc>
                 <a:tc>
                   <a:txBody>
                     <a:bodyPr/>
                     <a:lstStyle/>
                     <a:p>
-                      <a:pPr fontAlgn="base"/>
+                      <a:pPr algn="l" fontAlgn="base"/>
                       <a:r>
                         <a:rPr lang="en-AU" sz="1100" b="0" i="0" kern="1200" dirty="0">
                           <a:solidFill>
@@ -3770,7 +3898,7 @@
                     <a:bodyPr/>
                     <a:lstStyle/>
                     <a:p>
-                      <a:pPr>
+                      <a:pPr algn="just">
                         <a:lnSpc>
                           <a:spcPct val="150000"/>
                         </a:lnSpc>
@@ -3815,14 +3943,20 @@
                           <a:effectLst/>
                           <a:latin typeface="+mj-lt"/>
                         </a:rPr>
-                        <a:t>As above; 85%</a:t>
-                      </a:r>
-                      <a:endParaRPr lang="en-AU" sz="1100" dirty="0">
-                        <a:effectLst/>
-                        <a:latin typeface="+mj-lt"/>
-                        <a:ea typeface="MS Mincho" panose="02020609040205080304" pitchFamily="49" charset="-128"/>
-                        <a:cs typeface="Times New Roman" panose="02020603050405020304" pitchFamily="18" charset="0"/>
-                      </a:endParaRPr>
+                        <a:t>80% </a:t>
+                      </a:r>
+                      <a:r>
+                        <a:rPr lang="en-AU" sz="1100" b="0" i="0" kern="1200" dirty="0">
+                          <a:solidFill>
+                            <a:schemeClr val="dk1"/>
+                          </a:solidFill>
+                          <a:effectLst/>
+                          <a:latin typeface="+mj-lt"/>
+                          <a:ea typeface="+mn-ea"/>
+                          <a:cs typeface="+mn-cs"/>
+                        </a:rPr>
+                        <a:t>- Concept &amp; design, data analysis, writing of manuscript </a:t>
+                      </a:r>
                     </a:p>
                   </a:txBody>
                   <a:tcPr marL="20629" marR="20629" marT="0" marB="0">
@@ -3847,7 +3981,7 @@
                           <a:effectLst/>
                           <a:latin typeface="+mj-lt"/>
                         </a:rPr>
-                        <a:t>1. Fulcher, BD. – 5%</a:t>
+                        <a:t>1. Fulcher, BD. – 10%</a:t>
                       </a:r>
                     </a:p>
                     <a:p>
@@ -3915,6 +4049,15 @@
                     </a:p>
                   </a:txBody>
                   <a:tcPr marL="20629" marR="20629" marT="0" marB="0">
+                    <a:lnR w="12700" cap="flat" cmpd="sng" algn="ctr">
+                      <a:solidFill>
+                        <a:schemeClr val="tx1"/>
+                      </a:solidFill>
+                      <a:prstDash val="solid"/>
+                      <a:round/>
+                      <a:headEnd type="none" w="med" len="med"/>
+                      <a:tailEnd type="none" w="med" len="med"/>
+                    </a:lnR>
                     <a:noFill/>
                   </a:tcPr>
                 </a:tc>
@@ -3924,13 +4067,13 @@
                   </a:ext>
                 </a:extLst>
               </a:tr>
-              <a:tr h="1178826">
+              <a:tr h="1146932">
                 <a:tc>
                   <a:txBody>
                     <a:bodyPr/>
                     <a:lstStyle/>
                     <a:p>
-                      <a:pPr marL="0" algn="ctr" defTabSz="719907" rtl="0" eaLnBrk="1" latinLnBrk="0" hangingPunct="1">
+                      <a:pPr marL="0" algn="r" defTabSz="719907" rtl="0" eaLnBrk="1" latinLnBrk="0" hangingPunct="1">
                         <a:lnSpc>
                           <a:spcPct val="150000"/>
                         </a:lnSpc>
@@ -3939,7 +4082,7 @@
                         </a:spcAft>
                       </a:pPr>
                       <a:r>
-                        <a:rPr lang="en-AU" sz="1100" b="1" kern="1200" dirty="0">
+                        <a:rPr lang="en-AU" sz="1000" b="1" kern="1200" dirty="0">
                           <a:solidFill>
                             <a:schemeClr val="lt1"/>
                           </a:solidFill>
@@ -3952,14 +4095,33 @@
                       </a:r>
                     </a:p>
                   </a:txBody>
-                  <a:tcPr marL="20629" marR="20629" marT="0" marB="0"/>
+                  <a:tcPr marL="20629" marR="20629" marT="0" marB="0">
+                    <a:lnL w="12700" cap="flat" cmpd="sng" algn="ctr">
+                      <a:solidFill>
+                        <a:schemeClr val="tx1"/>
+                      </a:solidFill>
+                      <a:prstDash val="solid"/>
+                      <a:round/>
+                      <a:headEnd type="none" w="med" len="med"/>
+                      <a:tailEnd type="none" w="med" len="med"/>
+                    </a:lnL>
+                    <a:lnB w="12700" cap="flat" cmpd="sng" algn="ctr">
+                      <a:solidFill>
+                        <a:schemeClr val="tx1"/>
+                      </a:solidFill>
+                      <a:prstDash val="solid"/>
+                      <a:round/>
+                      <a:headEnd type="none" w="med" len="med"/>
+                      <a:tailEnd type="none" w="med" len="med"/>
+                    </a:lnB>
+                  </a:tcPr>
                 </a:tc>
                 <a:tc>
                   <a:txBody>
                     <a:bodyPr/>
                     <a:lstStyle/>
                     <a:p>
-                      <a:pPr fontAlgn="base"/>
+                      <a:pPr algn="l" fontAlgn="base"/>
                       <a:r>
                         <a:rPr lang="en-AU" sz="1100" b="0" i="0" kern="1200" dirty="0">
                           <a:solidFill>
@@ -3975,6 +4137,15 @@
                     </a:p>
                   </a:txBody>
                   <a:tcPr marL="20629" marR="20629" marT="0" marB="0">
+                    <a:lnB w="12700" cap="flat" cmpd="sng" algn="ctr">
+                      <a:solidFill>
+                        <a:schemeClr val="tx1"/>
+                      </a:solidFill>
+                      <a:prstDash val="solid"/>
+                      <a:round/>
+                      <a:headEnd type="none" w="med" len="med"/>
+                      <a:tailEnd type="none" w="med" len="med"/>
+                    </a:lnB>
                     <a:noFill/>
                   </a:tcPr>
                 </a:tc>
@@ -3983,7 +4154,7 @@
                     <a:bodyPr/>
                     <a:lstStyle/>
                     <a:p>
-                      <a:pPr>
+                      <a:pPr algn="just">
                         <a:lnSpc>
                           <a:spcPct val="150000"/>
                         </a:lnSpc>
@@ -4003,6 +4174,15 @@
                     </a:p>
                   </a:txBody>
                   <a:tcPr marL="20629" marR="20629" marT="0" marB="0">
+                    <a:lnB w="12700" cap="flat" cmpd="sng" algn="ctr">
+                      <a:solidFill>
+                        <a:schemeClr val="tx1"/>
+                      </a:solidFill>
+                      <a:prstDash val="solid"/>
+                      <a:round/>
+                      <a:headEnd type="none" w="med" len="med"/>
+                      <a:tailEnd type="none" w="med" len="med"/>
+                    </a:lnB>
                     <a:noFill/>
                   </a:tcPr>
                 </a:tc>
@@ -4038,7 +4218,19 @@
                           <a:ea typeface="+mn-ea"/>
                           <a:cs typeface="+mn-cs"/>
                         </a:rPr>
-                        <a:t>As above; 80%</a:t>
+                        <a:t>80% - </a:t>
+                      </a:r>
+                      <a:r>
+                        <a:rPr lang="en-AU" sz="1100" b="0" i="0" kern="1200" dirty="0">
+                          <a:solidFill>
+                            <a:schemeClr val="dk1"/>
+                          </a:solidFill>
+                          <a:effectLst/>
+                          <a:latin typeface="+mj-lt"/>
+                          <a:ea typeface="+mn-ea"/>
+                          <a:cs typeface="+mn-cs"/>
+                        </a:rPr>
+                        <a:t>Concept &amp; design, data analysis, writing of manuscript </a:t>
                       </a:r>
                     </a:p>
                     <a:p>
@@ -4062,6 +4254,15 @@
                     </a:p>
                   </a:txBody>
                   <a:tcPr marL="20629" marR="20629" marT="0" marB="0">
+                    <a:lnB w="12700" cap="flat" cmpd="sng" algn="ctr">
+                      <a:solidFill>
+                        <a:schemeClr val="tx1"/>
+                      </a:solidFill>
+                      <a:prstDash val="solid"/>
+                      <a:round/>
+                      <a:headEnd type="none" w="med" len="med"/>
+                      <a:tailEnd type="none" w="med" len="med"/>
+                    </a:lnB>
                     <a:noFill/>
                   </a:tcPr>
                 </a:tc>
@@ -4216,6 +4417,15 @@
                     </a:p>
                   </a:txBody>
                   <a:tcPr marL="20629" marR="20629" marT="0" marB="0">
+                    <a:lnB w="12700" cap="flat" cmpd="sng" algn="ctr">
+                      <a:solidFill>
+                        <a:schemeClr val="tx1"/>
+                      </a:solidFill>
+                      <a:prstDash val="solid"/>
+                      <a:round/>
+                      <a:headEnd type="none" w="med" len="med"/>
+                      <a:tailEnd type="none" w="med" len="med"/>
+                    </a:lnB>
                     <a:noFill/>
                   </a:tcPr>
                 </a:tc>
@@ -4269,6 +4479,24 @@
                     </a:p>
                   </a:txBody>
                   <a:tcPr marL="20629" marR="20629" marT="0" marB="0">
+                    <a:lnR w="12700" cap="flat" cmpd="sng" algn="ctr">
+                      <a:solidFill>
+                        <a:schemeClr val="tx1"/>
+                      </a:solidFill>
+                      <a:prstDash val="solid"/>
+                      <a:round/>
+                      <a:headEnd type="none" w="med" len="med"/>
+                      <a:tailEnd type="none" w="med" len="med"/>
+                    </a:lnR>
+                    <a:lnB w="12700" cap="flat" cmpd="sng" algn="ctr">
+                      <a:solidFill>
+                        <a:schemeClr val="tx1"/>
+                      </a:solidFill>
+                      <a:prstDash val="solid"/>
+                      <a:round/>
+                      <a:headEnd type="none" w="med" len="med"/>
+                      <a:tailEnd type="none" w="med" len="med"/>
+                    </a:lnB>
                     <a:noFill/>
                   </a:tcPr>
                 </a:tc>

</xml_diff>